<commit_message>
Modified to use Secrets Manager for RDS Secrets
</commit_message>
<xml_diff>
--- a/images/wordpress-midarch-images.pptx
+++ b/images/wordpress-midarch-images.pptx
@@ -104,6 +104,11 @@
       </a:defRPr>
     </a:lvl9pPr>
   </p:defaultTextStyle>
+  <p:extLst>
+    <p:ext uri="{EFAFB233-063F-42B5-8137-9DF3F51BA10A}">
+      <p15:sldGuideLst xmlns:p15="http://schemas.microsoft.com/office/powerpoint/2012/main"/>
+    </p:ext>
+  </p:extLst>
 </p:presentation>
 </file>
 
@@ -254,7 +259,7 @@
           <a:p>
             <a:fld id="{0CD911A6-E724-5D41-B5CE-8BCD0CA4E178}" type="datetimeFigureOut">
               <a:rPr kumimoji="1" lang="ja-JP" altLang="en-US" smtClean="0"/>
-              <a:t>2019/6/2</a:t>
+              <a:t>2019/6/4</a:t>
             </a:fld>
             <a:endParaRPr kumimoji="1" lang="ja-JP" altLang="en-US"/>
           </a:p>
@@ -459,7 +464,7 @@
           <a:p>
             <a:fld id="{0CD911A6-E724-5D41-B5CE-8BCD0CA4E178}" type="datetimeFigureOut">
               <a:rPr kumimoji="1" lang="ja-JP" altLang="en-US" smtClean="0"/>
-              <a:t>2019/6/2</a:t>
+              <a:t>2019/6/4</a:t>
             </a:fld>
             <a:endParaRPr kumimoji="1" lang="ja-JP" altLang="en-US"/>
           </a:p>
@@ -674,7 +679,7 @@
           <a:p>
             <a:fld id="{0CD911A6-E724-5D41-B5CE-8BCD0CA4E178}" type="datetimeFigureOut">
               <a:rPr kumimoji="1" lang="ja-JP" altLang="en-US" smtClean="0"/>
-              <a:t>2019/6/2</a:t>
+              <a:t>2019/6/4</a:t>
             </a:fld>
             <a:endParaRPr kumimoji="1" lang="ja-JP" altLang="en-US"/>
           </a:p>
@@ -879,7 +884,7 @@
           <a:p>
             <a:fld id="{0CD911A6-E724-5D41-B5CE-8BCD0CA4E178}" type="datetimeFigureOut">
               <a:rPr kumimoji="1" lang="ja-JP" altLang="en-US" smtClean="0"/>
-              <a:t>2019/6/2</a:t>
+              <a:t>2019/6/4</a:t>
             </a:fld>
             <a:endParaRPr kumimoji="1" lang="ja-JP" altLang="en-US"/>
           </a:p>
@@ -1189,7 +1194,7 @@
           <a:p>
             <a:fld id="{0CD911A6-E724-5D41-B5CE-8BCD0CA4E178}" type="datetimeFigureOut">
               <a:rPr kumimoji="1" lang="ja-JP" altLang="en-US" smtClean="0"/>
-              <a:t>2019/6/2</a:t>
+              <a:t>2019/6/4</a:t>
             </a:fld>
             <a:endParaRPr kumimoji="1" lang="ja-JP" altLang="en-US"/>
           </a:p>
@@ -1468,7 +1473,7 @@
           <a:p>
             <a:fld id="{0CD911A6-E724-5D41-B5CE-8BCD0CA4E178}" type="datetimeFigureOut">
               <a:rPr kumimoji="1" lang="ja-JP" altLang="en-US" smtClean="0"/>
-              <a:t>2019/6/2</a:t>
+              <a:t>2019/6/4</a:t>
             </a:fld>
             <a:endParaRPr kumimoji="1" lang="ja-JP" altLang="en-US"/>
           </a:p>
@@ -1964,7 +1969,7 @@
           <a:p>
             <a:fld id="{0CD911A6-E724-5D41-B5CE-8BCD0CA4E178}" type="datetimeFigureOut">
               <a:rPr kumimoji="1" lang="ja-JP" altLang="en-US" smtClean="0"/>
-              <a:t>2019/6/2</a:t>
+              <a:t>2019/6/4</a:t>
             </a:fld>
             <a:endParaRPr kumimoji="1" lang="ja-JP" altLang="en-US"/>
           </a:p>
@@ -2105,7 +2110,7 @@
           <a:p>
             <a:fld id="{0CD911A6-E724-5D41-B5CE-8BCD0CA4E178}" type="datetimeFigureOut">
               <a:rPr kumimoji="1" lang="ja-JP" altLang="en-US" smtClean="0"/>
-              <a:t>2019/6/2</a:t>
+              <a:t>2019/6/4</a:t>
             </a:fld>
             <a:endParaRPr kumimoji="1" lang="ja-JP" altLang="en-US"/>
           </a:p>
@@ -2218,7 +2223,7 @@
           <a:p>
             <a:fld id="{0CD911A6-E724-5D41-B5CE-8BCD0CA4E178}" type="datetimeFigureOut">
               <a:rPr kumimoji="1" lang="ja-JP" altLang="en-US" smtClean="0"/>
-              <a:t>2019/6/2</a:t>
+              <a:t>2019/6/4</a:t>
             </a:fld>
             <a:endParaRPr kumimoji="1" lang="ja-JP" altLang="en-US"/>
           </a:p>
@@ -2571,7 +2576,7 @@
           <a:p>
             <a:fld id="{0CD911A6-E724-5D41-B5CE-8BCD0CA4E178}" type="datetimeFigureOut">
               <a:rPr kumimoji="1" lang="ja-JP" altLang="en-US" smtClean="0"/>
-              <a:t>2019/6/2</a:t>
+              <a:t>2019/6/4</a:t>
             </a:fld>
             <a:endParaRPr kumimoji="1" lang="ja-JP" altLang="en-US"/>
           </a:p>
@@ -2894,7 +2899,7 @@
           <a:p>
             <a:fld id="{0CD911A6-E724-5D41-B5CE-8BCD0CA4E178}" type="datetimeFigureOut">
               <a:rPr kumimoji="1" lang="ja-JP" altLang="en-US" smtClean="0"/>
-              <a:t>2019/6/2</a:t>
+              <a:t>2019/6/4</a:t>
             </a:fld>
             <a:endParaRPr kumimoji="1" lang="ja-JP" altLang="en-US"/>
           </a:p>
@@ -3142,7 +3147,7 @@
           <a:p>
             <a:fld id="{0CD911A6-E724-5D41-B5CE-8BCD0CA4E178}" type="datetimeFigureOut">
               <a:rPr kumimoji="1" lang="ja-JP" altLang="en-US" smtClean="0"/>
-              <a:t>2019/6/2</a:t>
+              <a:t>2019/6/4</a:t>
             </a:fld>
             <a:endParaRPr kumimoji="1" lang="ja-JP" altLang="en-US"/>
           </a:p>
@@ -3648,8 +3653,8 @@
         </p:nvSpPr>
         <p:spPr>
           <a:xfrm>
-            <a:off x="1294388" y="1536192"/>
-            <a:ext cx="7617964" cy="4795932"/>
+            <a:off x="324091" y="1536192"/>
+            <a:ext cx="8588261" cy="4795932"/>
           </a:xfrm>
           <a:prstGeom prst="rect">
             <a:avLst/>
@@ -3737,7 +3742,7 @@
         </p:blipFill>
         <p:spPr>
           <a:xfrm>
-            <a:off x="1294207" y="1539203"/>
+            <a:off x="324091" y="1536192"/>
             <a:ext cx="330200" cy="330200"/>
           </a:xfrm>
           <a:prstGeom prst="rect">
@@ -4016,42 +4021,6 @@
           <a:xfrm>
             <a:off x="2220732" y="2698139"/>
             <a:ext cx="330200" cy="330200"/>
-          </a:xfrm>
-          <a:prstGeom prst="rect">
-            <a:avLst/>
-          </a:prstGeom>
-        </p:spPr>
-      </p:pic>
-      <p:pic>
-        <p:nvPicPr>
-          <p:cNvPr id="24" name="Graphic 35">
-            <a:extLst>
-              <a:ext uri="{FF2B5EF4-FFF2-40B4-BE49-F238E27FC236}">
-                <a16:creationId xmlns:a16="http://schemas.microsoft.com/office/drawing/2014/main" id="{88DA5F91-A6A5-4049-8A16-FF89908DC686}"/>
-              </a:ext>
-            </a:extLst>
-          </p:cNvPr>
-          <p:cNvPicPr>
-            <a:picLocks noChangeAspect="1"/>
-          </p:cNvPicPr>
-          <p:nvPr/>
-        </p:nvPicPr>
-        <p:blipFill>
-          <a:blip r:embed="rId8">
-            <a:extLst>
-              <a:ext uri="{96DAC541-7B7A-43D3-8B79-37D633B846F1}">
-                <asvg:svgBlip xmlns:asvg="http://schemas.microsoft.com/office/drawing/2016/SVG/main" r:embed="rId9"/>
-              </a:ext>
-            </a:extLst>
-          </a:blip>
-          <a:stretch>
-            <a:fillRect/>
-          </a:stretch>
-        </p:blipFill>
-        <p:spPr>
-          <a:xfrm>
-            <a:off x="8087139" y="2928882"/>
-            <a:ext cx="469900" cy="469900"/>
           </a:xfrm>
           <a:prstGeom prst="rect">
             <a:avLst/>
@@ -4169,42 +4138,6 @@
           </a:p>
         </p:txBody>
       </p:sp>
-      <p:pic>
-        <p:nvPicPr>
-          <p:cNvPr id="31" name="Graphic 10">
-            <a:extLst>
-              <a:ext uri="{FF2B5EF4-FFF2-40B4-BE49-F238E27FC236}">
-                <a16:creationId xmlns:a16="http://schemas.microsoft.com/office/drawing/2014/main" id="{809FE698-9FBB-5844-AAEC-1D373DE02DBC}"/>
-              </a:ext>
-            </a:extLst>
-          </p:cNvPr>
-          <p:cNvPicPr>
-            <a:picLocks noChangeAspect="1"/>
-          </p:cNvPicPr>
-          <p:nvPr/>
-        </p:nvPicPr>
-        <p:blipFill>
-          <a:blip r:embed="rId10">
-            <a:extLst>
-              <a:ext uri="{96DAC541-7B7A-43D3-8B79-37D633B846F1}">
-                <asvg:svgBlip xmlns:asvg="http://schemas.microsoft.com/office/drawing/2016/SVG/main" r:embed="rId11"/>
-              </a:ext>
-            </a:extLst>
-          </a:blip>
-          <a:stretch>
-            <a:fillRect/>
-          </a:stretch>
-        </p:blipFill>
-        <p:spPr>
-          <a:xfrm>
-            <a:off x="5014391" y="3420241"/>
-            <a:ext cx="228376" cy="277535"/>
-          </a:xfrm>
-          <a:prstGeom prst="rect">
-            <a:avLst/>
-          </a:prstGeom>
-        </p:spPr>
-      </p:pic>
       <p:sp>
         <p:nvSpPr>
           <p:cNvPr id="32" name="Rectangle 36">
@@ -4613,12 +4546,51 @@
           </a:prstGeom>
         </p:spPr>
       </p:pic>
+      <p:sp>
+        <p:nvSpPr>
+          <p:cNvPr id="42" name="TextBox 58">
+            <a:extLst>
+              <a:ext uri="{FF2B5EF4-FFF2-40B4-BE49-F238E27FC236}">
+                <a16:creationId xmlns:a16="http://schemas.microsoft.com/office/drawing/2014/main" id="{902465BA-6637-A748-914B-70A22AF21A41}"/>
+              </a:ext>
+            </a:extLst>
+          </p:cNvPr>
+          <p:cNvSpPr txBox="1"/>
+          <p:nvPr/>
+        </p:nvSpPr>
+        <p:spPr>
+          <a:xfrm>
+            <a:off x="3927796" y="1070288"/>
+            <a:ext cx="812723" cy="184666"/>
+          </a:xfrm>
+          <a:prstGeom prst="rect">
+            <a:avLst/>
+          </a:prstGeom>
+          <a:noFill/>
+        </p:spPr>
+        <p:txBody>
+          <a:bodyPr wrap="none" lIns="0" tIns="0" rIns="0" bIns="0" rtlCol="0">
+            <a:spAutoFit/>
+          </a:bodyPr>
+          <a:lstStyle/>
+          <a:p>
+            <a:pPr algn="ctr"/>
+            <a:r>
+              <a:rPr lang="en-US" sz="1200" dirty="0">
+                <a:latin typeface="Noto Sans CJK JP" panose="020B0500000000000000" pitchFamily="34" charset="-128"/>
+                <a:ea typeface="Noto Sans CJK JP" panose="020B0500000000000000" pitchFamily="34" charset="-128"/>
+              </a:rPr>
+              <a:t>CloudFront</a:t>
+            </a:r>
+          </a:p>
+        </p:txBody>
+      </p:sp>
       <p:pic>
         <p:nvPicPr>
-          <p:cNvPr id="41" name="Graphic 7">
-            <a:extLst>
-              <a:ext uri="{FF2B5EF4-FFF2-40B4-BE49-F238E27FC236}">
-                <a16:creationId xmlns:a16="http://schemas.microsoft.com/office/drawing/2014/main" id="{56D5A82C-4197-2341-8BB9-E890B6ACCC35}"/>
+          <p:cNvPr id="43" name="Graphic 24">
+            <a:extLst>
+              <a:ext uri="{FF2B5EF4-FFF2-40B4-BE49-F238E27FC236}">
+                <a16:creationId xmlns:a16="http://schemas.microsoft.com/office/drawing/2014/main" id="{9A7A5B76-77AE-414E-B157-6C7A62D03EEA}"/>
               </a:ext>
             </a:extLst>
           </p:cNvPr>
@@ -4628,85 +4600,10 @@
           <p:nvPr/>
         </p:nvPicPr>
         <p:blipFill>
-          <a:blip r:embed="rId12">
+          <a:blip r:embed="rId8">
             <a:extLst>
               <a:ext uri="{96DAC541-7B7A-43D3-8B79-37D633B846F1}">
-                <asvg:svgBlip xmlns:asvg="http://schemas.microsoft.com/office/drawing/2016/SVG/main" r:embed="rId13"/>
-              </a:ext>
-            </a:extLst>
-          </a:blip>
-          <a:stretch>
-            <a:fillRect/>
-          </a:stretch>
-        </p:blipFill>
-        <p:spPr>
-          <a:xfrm>
-            <a:off x="4904030" y="2690590"/>
-            <a:ext cx="395990" cy="395990"/>
-          </a:xfrm>
-          <a:prstGeom prst="rect">
-            <a:avLst/>
-          </a:prstGeom>
-        </p:spPr>
-      </p:pic>
-      <p:sp>
-        <p:nvSpPr>
-          <p:cNvPr id="42" name="TextBox 58">
-            <a:extLst>
-              <a:ext uri="{FF2B5EF4-FFF2-40B4-BE49-F238E27FC236}">
-                <a16:creationId xmlns:a16="http://schemas.microsoft.com/office/drawing/2014/main" id="{902465BA-6637-A748-914B-70A22AF21A41}"/>
-              </a:ext>
-            </a:extLst>
-          </p:cNvPr>
-          <p:cNvSpPr txBox="1"/>
-          <p:nvPr/>
-        </p:nvSpPr>
-        <p:spPr>
-          <a:xfrm>
-            <a:off x="3927796" y="1070288"/>
-            <a:ext cx="812723" cy="184666"/>
-          </a:xfrm>
-          <a:prstGeom prst="rect">
-            <a:avLst/>
-          </a:prstGeom>
-          <a:noFill/>
-        </p:spPr>
-        <p:txBody>
-          <a:bodyPr wrap="none" lIns="0" tIns="0" rIns="0" bIns="0" rtlCol="0">
-            <a:spAutoFit/>
-          </a:bodyPr>
-          <a:lstStyle/>
-          <a:p>
-            <a:pPr algn="ctr"/>
-            <a:r>
-              <a:rPr lang="en-US" sz="1200" dirty="0">
-                <a:latin typeface="Noto Sans CJK JP" panose="020B0500000000000000" pitchFamily="34" charset="-128"/>
-                <a:ea typeface="Noto Sans CJK JP" panose="020B0500000000000000" pitchFamily="34" charset="-128"/>
-              </a:rPr>
-              <a:t>CloudFront</a:t>
-            </a:r>
-          </a:p>
-        </p:txBody>
-      </p:sp>
-      <p:pic>
-        <p:nvPicPr>
-          <p:cNvPr id="43" name="Graphic 24">
-            <a:extLst>
-              <a:ext uri="{FF2B5EF4-FFF2-40B4-BE49-F238E27FC236}">
-                <a16:creationId xmlns:a16="http://schemas.microsoft.com/office/drawing/2014/main" id="{9A7A5B76-77AE-414E-B157-6C7A62D03EEA}"/>
-              </a:ext>
-            </a:extLst>
-          </p:cNvPr>
-          <p:cNvPicPr>
-            <a:picLocks noChangeAspect="1"/>
-          </p:cNvPicPr>
-          <p:nvPr/>
-        </p:nvPicPr>
-        <p:blipFill>
-          <a:blip r:embed="rId14">
-            <a:extLst>
-              <a:ext uri="{96DAC541-7B7A-43D3-8B79-37D633B846F1}">
-                <asvg:svgBlip xmlns:asvg="http://schemas.microsoft.com/office/drawing/2016/SVG/main" r:embed="rId15"/>
+                <asvg:svgBlip xmlns:asvg="http://schemas.microsoft.com/office/drawing/2016/SVG/main" r:embed="rId9"/>
               </a:ext>
             </a:extLst>
           </a:blip>
@@ -4801,10 +4698,10 @@
           <p:nvPr/>
         </p:nvPicPr>
         <p:blipFill>
-          <a:blip r:embed="rId14">
+          <a:blip r:embed="rId8">
             <a:extLst>
               <a:ext uri="{96DAC541-7B7A-43D3-8B79-37D633B846F1}">
-                <asvg:svgBlip xmlns:asvg="http://schemas.microsoft.com/office/drawing/2016/SVG/main" r:embed="rId15"/>
+                <asvg:svgBlip xmlns:asvg="http://schemas.microsoft.com/office/drawing/2016/SVG/main" r:embed="rId9"/>
               </a:ext>
             </a:extLst>
           </a:blip>
@@ -4899,10 +4796,10 @@
           <p:nvPr/>
         </p:nvPicPr>
         <p:blipFill>
-          <a:blip r:embed="rId14">
+          <a:blip r:embed="rId8">
             <a:extLst>
               <a:ext uri="{96DAC541-7B7A-43D3-8B79-37D633B846F1}">
-                <asvg:svgBlip xmlns:asvg="http://schemas.microsoft.com/office/drawing/2016/SVG/main" r:embed="rId15"/>
+                <asvg:svgBlip xmlns:asvg="http://schemas.microsoft.com/office/drawing/2016/SVG/main" r:embed="rId9"/>
               </a:ext>
             </a:extLst>
           </a:blip>
@@ -5066,7 +4963,6 @@
           </p:cNvPr>
           <p:cNvCxnSpPr>
             <a:cxnSpLocks/>
-            <a:stCxn id="41" idx="2"/>
             <a:endCxn id="47" idx="0"/>
           </p:cNvCxnSpPr>
           <p:nvPr/>
@@ -5105,7 +5001,6 @@
           </p:cNvPr>
           <p:cNvCxnSpPr>
             <a:cxnSpLocks/>
-            <a:stCxn id="41" idx="2"/>
             <a:endCxn id="43" idx="0"/>
           </p:cNvCxnSpPr>
           <p:nvPr/>
@@ -5144,7 +5039,6 @@
           </p:cNvPr>
           <p:cNvCxnSpPr>
             <a:cxnSpLocks/>
-            <a:stCxn id="41" idx="2"/>
             <a:endCxn id="45" idx="0"/>
           </p:cNvCxnSpPr>
           <p:nvPr/>
@@ -5187,10 +5081,10 @@
           <p:nvPr/>
         </p:nvPicPr>
         <p:blipFill>
-          <a:blip r:embed="rId16">
+          <a:blip r:embed="rId10">
             <a:extLst>
               <a:ext uri="{96DAC541-7B7A-43D3-8B79-37D633B846F1}">
-                <asvg:svgBlip xmlns:asvg="http://schemas.microsoft.com/office/drawing/2016/SVG/main" r:embed="rId17"/>
+                <asvg:svgBlip xmlns:asvg="http://schemas.microsoft.com/office/drawing/2016/SVG/main" r:embed="rId11"/>
               </a:ext>
             </a:extLst>
           </a:blip>
@@ -5278,10 +5172,10 @@
           <p:nvPr/>
         </p:nvPicPr>
         <p:blipFill>
-          <a:blip r:embed="rId16">
+          <a:blip r:embed="rId10">
             <a:extLst>
               <a:ext uri="{96DAC541-7B7A-43D3-8B79-37D633B846F1}">
-                <asvg:svgBlip xmlns:asvg="http://schemas.microsoft.com/office/drawing/2016/SVG/main" r:embed="rId17"/>
+                <asvg:svgBlip xmlns:asvg="http://schemas.microsoft.com/office/drawing/2016/SVG/main" r:embed="rId11"/>
               </a:ext>
             </a:extLst>
           </a:blip>
@@ -5369,10 +5263,10 @@
           <p:nvPr/>
         </p:nvPicPr>
         <p:blipFill>
-          <a:blip r:embed="rId18">
+          <a:blip r:embed="rId12">
             <a:extLst>
               <a:ext uri="{96DAC541-7B7A-43D3-8B79-37D633B846F1}">
-                <asvg:svgBlip xmlns:asvg="http://schemas.microsoft.com/office/drawing/2016/SVG/main" r:embed="rId19"/>
+                <asvg:svgBlip xmlns:asvg="http://schemas.microsoft.com/office/drawing/2016/SVG/main" r:embed="rId13"/>
               </a:ext>
             </a:extLst>
           </a:blip>
@@ -5405,10 +5299,10 @@
           <p:nvPr/>
         </p:nvPicPr>
         <p:blipFill>
-          <a:blip r:embed="rId20">
+          <a:blip r:embed="rId14">
             <a:extLst>
               <a:ext uri="{96DAC541-7B7A-43D3-8B79-37D633B846F1}">
-                <asvg:svgBlip xmlns:asvg="http://schemas.microsoft.com/office/drawing/2016/SVG/main" r:embed="rId21"/>
+                <asvg:svgBlip xmlns:asvg="http://schemas.microsoft.com/office/drawing/2016/SVG/main" r:embed="rId15"/>
               </a:ext>
             </a:extLst>
           </a:blip>
@@ -5480,10 +5374,10 @@
           <p:nvPr/>
         </p:nvPicPr>
         <p:blipFill>
-          <a:blip r:embed="rId22">
+          <a:blip r:embed="rId16">
             <a:extLst>
               <a:ext uri="{96DAC541-7B7A-43D3-8B79-37D633B846F1}">
-                <asvg:svgBlip xmlns:asvg="http://schemas.microsoft.com/office/drawing/2016/SVG/main" r:embed="rId23"/>
+                <asvg:svgBlip xmlns:asvg="http://schemas.microsoft.com/office/drawing/2016/SVG/main" r:embed="rId17"/>
               </a:ext>
             </a:extLst>
           </a:blip>
@@ -5591,14 +5485,14 @@
           <p:cNvCxnSpPr>
             <a:cxnSpLocks/>
             <a:stCxn id="73" idx="2"/>
-            <a:endCxn id="41" idx="0"/>
+            <a:endCxn id="71" idx="0"/>
           </p:cNvCxnSpPr>
           <p:nvPr/>
         </p:nvCxnSpPr>
         <p:spPr>
-          <a:xfrm rot="16200000" flipH="1">
-            <a:off x="4421663" y="2010228"/>
-            <a:ext cx="1358476" cy="2248"/>
+          <a:xfrm rot="5400000">
+            <a:off x="4456543" y="1973640"/>
+            <a:ext cx="1284761" cy="1709"/>
           </a:xfrm>
           <a:prstGeom prst="bentConnector3">
             <a:avLst>
@@ -5630,7 +5524,6 @@
           <p:cNvCxnSpPr>
             <a:cxnSpLocks/>
             <a:stCxn id="73" idx="2"/>
-            <a:endCxn id="24" idx="0"/>
           </p:cNvCxnSpPr>
           <p:nvPr/>
         </p:nvCxnSpPr>
@@ -5657,6 +5550,724 @@
           <a:effectLst/>
         </p:spPr>
       </p:cxnSp>
+      <p:pic>
+        <p:nvPicPr>
+          <p:cNvPr id="50" name="Graphic 20">
+            <a:extLst>
+              <a:ext uri="{FF2B5EF4-FFF2-40B4-BE49-F238E27FC236}">
+                <a16:creationId xmlns:a16="http://schemas.microsoft.com/office/drawing/2014/main" id="{0503FBFF-EC55-BF44-8BAE-50A53E253415}"/>
+              </a:ext>
+            </a:extLst>
+          </p:cNvPr>
+          <p:cNvPicPr>
+            <a:picLocks noChangeAspect="1"/>
+          </p:cNvPicPr>
+          <p:nvPr/>
+        </p:nvPicPr>
+        <p:blipFill>
+          <a:blip r:embed="rId18">
+            <a:extLst>
+              <a:ext uri="{96DAC541-7B7A-43D3-8B79-37D633B846F1}">
+                <asvg:svgBlip xmlns:asvg="http://schemas.microsoft.com/office/drawing/2016/SVG/main" r:embed="rId19"/>
+              </a:ext>
+            </a:extLst>
+          </a:blip>
+          <a:stretch>
+            <a:fillRect/>
+          </a:stretch>
+        </p:blipFill>
+        <p:spPr>
+          <a:xfrm>
+            <a:off x="584315" y="4353934"/>
+            <a:ext cx="453220" cy="453220"/>
+          </a:xfrm>
+          <a:prstGeom prst="rect">
+            <a:avLst/>
+          </a:prstGeom>
+        </p:spPr>
+      </p:pic>
+      <p:sp>
+        <p:nvSpPr>
+          <p:cNvPr id="52" name="TextBox 25">
+            <a:extLst>
+              <a:ext uri="{FF2B5EF4-FFF2-40B4-BE49-F238E27FC236}">
+                <a16:creationId xmlns:a16="http://schemas.microsoft.com/office/drawing/2014/main" id="{D5ED280A-2200-7D46-9772-D2CCC50C432F}"/>
+              </a:ext>
+            </a:extLst>
+          </p:cNvPr>
+          <p:cNvSpPr txBox="1"/>
+          <p:nvPr/>
+        </p:nvSpPr>
+        <p:spPr>
+          <a:xfrm>
+            <a:off x="550895" y="4852487"/>
+            <a:ext cx="573876" cy="338554"/>
+          </a:xfrm>
+          <a:prstGeom prst="rect">
+            <a:avLst/>
+          </a:prstGeom>
+          <a:noFill/>
+        </p:spPr>
+        <p:txBody>
+          <a:bodyPr wrap="none" lIns="0" tIns="0" rIns="0" bIns="0" rtlCol="0">
+            <a:spAutoFit/>
+          </a:bodyPr>
+          <a:lstStyle/>
+          <a:p>
+            <a:pPr algn="ctr"/>
+            <a:r>
+              <a:rPr lang="en-US" sz="1100" dirty="0">
+                <a:solidFill>
+                  <a:srgbClr val="232F3E"/>
+                </a:solidFill>
+                <a:latin typeface="Noto Sans CJK JP" panose="020B0500000000000000" pitchFamily="34" charset="-128"/>
+                <a:ea typeface="Noto Sans CJK JP" panose="020B0500000000000000" pitchFamily="34" charset="-128"/>
+              </a:rPr>
+              <a:t>Secrets</a:t>
+            </a:r>
+          </a:p>
+          <a:p>
+            <a:pPr algn="ctr"/>
+            <a:r>
+              <a:rPr lang="en-US" sz="1100" dirty="0">
+                <a:solidFill>
+                  <a:srgbClr val="232F3E"/>
+                </a:solidFill>
+                <a:latin typeface="Noto Sans CJK JP" panose="020B0500000000000000" pitchFamily="34" charset="-128"/>
+                <a:ea typeface="Noto Sans CJK JP" panose="020B0500000000000000" pitchFamily="34" charset="-128"/>
+              </a:rPr>
+              <a:t>Manager</a:t>
+            </a:r>
+          </a:p>
+        </p:txBody>
+      </p:sp>
+      <p:cxnSp>
+        <p:nvCxnSpPr>
+          <p:cNvPr id="53" name="Straight Arrow Connector 30">
+            <a:extLst>
+              <a:ext uri="{FF2B5EF4-FFF2-40B4-BE49-F238E27FC236}">
+                <a16:creationId xmlns:a16="http://schemas.microsoft.com/office/drawing/2014/main" id="{E5CD40E7-45C4-2940-A212-4D0FEC66047D}"/>
+              </a:ext>
+            </a:extLst>
+          </p:cNvPr>
+          <p:cNvCxnSpPr>
+            <a:cxnSpLocks/>
+            <a:endCxn id="50" idx="3"/>
+          </p:cNvCxnSpPr>
+          <p:nvPr/>
+        </p:nvCxnSpPr>
+        <p:spPr>
+          <a:xfrm flipH="1" flipV="1">
+            <a:off x="1037535" y="4580544"/>
+            <a:ext cx="1922660" cy="660354"/>
+          </a:xfrm>
+          <a:prstGeom prst="straightConnector1">
+            <a:avLst/>
+          </a:prstGeom>
+          <a:ln w="12700">
+            <a:solidFill>
+              <a:srgbClr val="545B64"/>
+            </a:solidFill>
+            <a:headEnd type="arrow" w="med" len="sm"/>
+            <a:tailEnd type="none" w="med" len="sm"/>
+          </a:ln>
+        </p:spPr>
+        <p:style>
+          <a:lnRef idx="1">
+            <a:schemeClr val="accent1"/>
+          </a:lnRef>
+          <a:fillRef idx="0">
+            <a:schemeClr val="accent1"/>
+          </a:fillRef>
+          <a:effectRef idx="0">
+            <a:schemeClr val="accent1"/>
+          </a:effectRef>
+          <a:fontRef idx="minor">
+            <a:schemeClr val="tx1"/>
+          </a:fontRef>
+        </p:style>
+      </p:cxnSp>
+      <p:cxnSp>
+        <p:nvCxnSpPr>
+          <p:cNvPr id="54" name="Straight Arrow Connector 30">
+            <a:extLst>
+              <a:ext uri="{FF2B5EF4-FFF2-40B4-BE49-F238E27FC236}">
+                <a16:creationId xmlns:a16="http://schemas.microsoft.com/office/drawing/2014/main" id="{30EBBF94-9F64-3A46-9155-556366D9281F}"/>
+              </a:ext>
+            </a:extLst>
+          </p:cNvPr>
+          <p:cNvCxnSpPr>
+            <a:cxnSpLocks/>
+            <a:endCxn id="50" idx="3"/>
+          </p:cNvCxnSpPr>
+          <p:nvPr/>
+        </p:nvCxnSpPr>
+        <p:spPr>
+          <a:xfrm flipH="1">
+            <a:off x="1037535" y="4013169"/>
+            <a:ext cx="1367967" cy="567375"/>
+          </a:xfrm>
+          <a:prstGeom prst="straightConnector1">
+            <a:avLst/>
+          </a:prstGeom>
+          <a:ln w="12700">
+            <a:solidFill>
+              <a:srgbClr val="545B64"/>
+            </a:solidFill>
+            <a:headEnd type="arrow" w="med" len="sm"/>
+            <a:tailEnd type="none" w="med" len="sm"/>
+          </a:ln>
+        </p:spPr>
+        <p:style>
+          <a:lnRef idx="1">
+            <a:schemeClr val="accent1"/>
+          </a:lnRef>
+          <a:fillRef idx="0">
+            <a:schemeClr val="accent1"/>
+          </a:fillRef>
+          <a:effectRef idx="0">
+            <a:schemeClr val="accent1"/>
+          </a:effectRef>
+          <a:fontRef idx="minor">
+            <a:schemeClr val="tx1"/>
+          </a:fontRef>
+        </p:style>
+      </p:cxnSp>
+      <p:pic>
+        <p:nvPicPr>
+          <p:cNvPr id="55" name="Graphic 122">
+            <a:extLst>
+              <a:ext uri="{FF2B5EF4-FFF2-40B4-BE49-F238E27FC236}">
+                <a16:creationId xmlns:a16="http://schemas.microsoft.com/office/drawing/2014/main" id="{C6FB5544-4211-804B-B43F-F5B9E89A4F71}"/>
+              </a:ext>
+            </a:extLst>
+          </p:cNvPr>
+          <p:cNvPicPr>
+            <a:picLocks noChangeAspect="1"/>
+          </p:cNvPicPr>
+          <p:nvPr/>
+        </p:nvPicPr>
+        <p:blipFill>
+          <a:blip r:embed="rId20">
+            <a:extLst>
+              <a:ext uri="{96DAC541-7B7A-43D3-8B79-37D633B846F1}">
+                <asvg:svgBlip xmlns:asvg="http://schemas.microsoft.com/office/drawing/2016/SVG/main" r:embed="rId21"/>
+              </a:ext>
+            </a:extLst>
+          </a:blip>
+          <a:stretch>
+            <a:fillRect/>
+          </a:stretch>
+        </p:blipFill>
+        <p:spPr>
+          <a:xfrm>
+            <a:off x="585620" y="3185291"/>
+            <a:ext cx="469900" cy="469900"/>
+          </a:xfrm>
+          <a:prstGeom prst="rect">
+            <a:avLst/>
+          </a:prstGeom>
+        </p:spPr>
+      </p:pic>
+      <p:sp>
+        <p:nvSpPr>
+          <p:cNvPr id="57" name="TextBox 25">
+            <a:extLst>
+              <a:ext uri="{FF2B5EF4-FFF2-40B4-BE49-F238E27FC236}">
+                <a16:creationId xmlns:a16="http://schemas.microsoft.com/office/drawing/2014/main" id="{6EB3896A-EE77-5A41-AB02-797E5C3E6890}"/>
+              </a:ext>
+            </a:extLst>
+          </p:cNvPr>
+          <p:cNvSpPr txBox="1"/>
+          <p:nvPr/>
+        </p:nvSpPr>
+        <p:spPr>
+          <a:xfrm>
+            <a:off x="485173" y="3718168"/>
+            <a:ext cx="705321" cy="338554"/>
+          </a:xfrm>
+          <a:prstGeom prst="rect">
+            <a:avLst/>
+          </a:prstGeom>
+          <a:noFill/>
+        </p:spPr>
+        <p:txBody>
+          <a:bodyPr wrap="none" lIns="0" tIns="0" rIns="0" bIns="0" rtlCol="0">
+            <a:spAutoFit/>
+          </a:bodyPr>
+          <a:lstStyle/>
+          <a:p>
+            <a:pPr algn="ctr"/>
+            <a:r>
+              <a:rPr lang="en-US" sz="1100" dirty="0">
+                <a:solidFill>
+                  <a:srgbClr val="232F3E"/>
+                </a:solidFill>
+                <a:latin typeface="Noto Sans CJK JP" panose="020B0500000000000000" pitchFamily="34" charset="-128"/>
+                <a:ea typeface="Noto Sans CJK JP" panose="020B0500000000000000" pitchFamily="34" charset="-128"/>
+              </a:rPr>
+              <a:t>WordPress</a:t>
+            </a:r>
+          </a:p>
+          <a:p>
+            <a:pPr algn="ctr"/>
+            <a:r>
+              <a:rPr lang="en-US" sz="1100" dirty="0">
+                <a:solidFill>
+                  <a:srgbClr val="232F3E"/>
+                </a:solidFill>
+                <a:latin typeface="Noto Sans CJK JP" panose="020B0500000000000000" pitchFamily="34" charset="-128"/>
+                <a:ea typeface="Noto Sans CJK JP" panose="020B0500000000000000" pitchFamily="34" charset="-128"/>
+              </a:rPr>
+              <a:t>AMI</a:t>
+            </a:r>
+          </a:p>
+        </p:txBody>
+      </p:sp>
+      <p:cxnSp>
+        <p:nvCxnSpPr>
+          <p:cNvPr id="60" name="Straight Arrow Connector 30">
+            <a:extLst>
+              <a:ext uri="{FF2B5EF4-FFF2-40B4-BE49-F238E27FC236}">
+                <a16:creationId xmlns:a16="http://schemas.microsoft.com/office/drawing/2014/main" id="{79F68B02-700D-D748-9523-C645FEEDDEE1}"/>
+              </a:ext>
+            </a:extLst>
+          </p:cNvPr>
+          <p:cNvCxnSpPr>
+            <a:cxnSpLocks/>
+            <a:stCxn id="30" idx="1"/>
+          </p:cNvCxnSpPr>
+          <p:nvPr/>
+        </p:nvCxnSpPr>
+        <p:spPr>
+          <a:xfrm flipH="1" flipV="1">
+            <a:off x="1074683" y="3561319"/>
+            <a:ext cx="2241541" cy="295867"/>
+          </a:xfrm>
+          <a:prstGeom prst="straightConnector1">
+            <a:avLst/>
+          </a:prstGeom>
+          <a:ln w="12700">
+            <a:solidFill>
+              <a:srgbClr val="545B64"/>
+            </a:solidFill>
+            <a:headEnd type="arrow" w="med" len="sm"/>
+            <a:tailEnd type="none" w="med" len="sm"/>
+          </a:ln>
+        </p:spPr>
+        <p:style>
+          <a:lnRef idx="1">
+            <a:schemeClr val="accent1"/>
+          </a:lnRef>
+          <a:fillRef idx="0">
+            <a:schemeClr val="accent1"/>
+          </a:fillRef>
+          <a:effectRef idx="0">
+            <a:schemeClr val="accent1"/>
+          </a:effectRef>
+          <a:fontRef idx="minor">
+            <a:schemeClr val="tx1"/>
+          </a:fontRef>
+        </p:style>
+      </p:cxnSp>
+      <p:pic>
+        <p:nvPicPr>
+          <p:cNvPr id="70" name="Graphic 123">
+            <a:extLst>
+              <a:ext uri="{FF2B5EF4-FFF2-40B4-BE49-F238E27FC236}">
+                <a16:creationId xmlns:a16="http://schemas.microsoft.com/office/drawing/2014/main" id="{8A78A021-7B62-E24B-A1A2-727AC13844FF}"/>
+              </a:ext>
+            </a:extLst>
+          </p:cNvPr>
+          <p:cNvPicPr>
+            <a:picLocks noChangeAspect="1"/>
+          </p:cNvPicPr>
+          <p:nvPr/>
+        </p:nvPicPr>
+        <p:blipFill>
+          <a:blip r:embed="rId22">
+            <a:extLst>
+              <a:ext uri="{96DAC541-7B7A-43D3-8B79-37D633B846F1}">
+                <asvg:svgBlip xmlns:asvg="http://schemas.microsoft.com/office/drawing/2016/SVG/main" r:embed="rId23"/>
+              </a:ext>
+            </a:extLst>
+          </a:blip>
+          <a:stretch>
+            <a:fillRect/>
+          </a:stretch>
+        </p:blipFill>
+        <p:spPr>
+          <a:xfrm>
+            <a:off x="4920504" y="3365207"/>
+            <a:ext cx="352961" cy="352961"/>
+          </a:xfrm>
+          <a:prstGeom prst="rect">
+            <a:avLst/>
+          </a:prstGeom>
+        </p:spPr>
+      </p:pic>
+      <p:pic>
+        <p:nvPicPr>
+          <p:cNvPr id="71" name="Graphic 16">
+            <a:extLst>
+              <a:ext uri="{FF2B5EF4-FFF2-40B4-BE49-F238E27FC236}">
+                <a16:creationId xmlns:a16="http://schemas.microsoft.com/office/drawing/2014/main" id="{DCFD8129-4D36-C74F-A8D5-8DBC1BDA8EAE}"/>
+              </a:ext>
+            </a:extLst>
+          </p:cNvPr>
+          <p:cNvPicPr>
+            <a:picLocks noChangeAspect="1"/>
+          </p:cNvPicPr>
+          <p:nvPr/>
+        </p:nvPicPr>
+        <p:blipFill>
+          <a:blip r:embed="rId24">
+            <a:extLst>
+              <a:ext uri="{96DAC541-7B7A-43D3-8B79-37D633B846F1}">
+                <asvg:svgBlip xmlns:asvg="http://schemas.microsoft.com/office/drawing/2016/SVG/main" r:embed="rId25"/>
+              </a:ext>
+            </a:extLst>
+          </a:blip>
+          <a:stretch>
+            <a:fillRect/>
+          </a:stretch>
+        </p:blipFill>
+        <p:spPr>
+          <a:xfrm>
+            <a:off x="4863118" y="2616875"/>
+            <a:ext cx="469900" cy="469900"/>
+          </a:xfrm>
+          <a:prstGeom prst="rect">
+            <a:avLst/>
+          </a:prstGeom>
+        </p:spPr>
+      </p:pic>
+      <p:pic>
+        <p:nvPicPr>
+          <p:cNvPr id="72" name="Graphic 38">
+            <a:extLst>
+              <a:ext uri="{FF2B5EF4-FFF2-40B4-BE49-F238E27FC236}">
+                <a16:creationId xmlns:a16="http://schemas.microsoft.com/office/drawing/2014/main" id="{FCB4D9C1-754A-D240-9E51-3965F55E0CC1}"/>
+              </a:ext>
+            </a:extLst>
+          </p:cNvPr>
+          <p:cNvPicPr>
+            <a:picLocks noChangeAspect="1"/>
+          </p:cNvPicPr>
+          <p:nvPr/>
+        </p:nvPicPr>
+        <p:blipFill>
+          <a:blip r:embed="rId26">
+            <a:extLst>
+              <a:ext uri="{96DAC541-7B7A-43D3-8B79-37D633B846F1}">
+                <asvg:svgBlip xmlns:asvg="http://schemas.microsoft.com/office/drawing/2016/SVG/main" r:embed="rId27"/>
+              </a:ext>
+            </a:extLst>
+          </a:blip>
+          <a:stretch>
+            <a:fillRect/>
+          </a:stretch>
+        </p:blipFill>
+        <p:spPr>
+          <a:xfrm>
+            <a:off x="8094012" y="2950341"/>
+            <a:ext cx="469900" cy="469900"/>
+          </a:xfrm>
+          <a:prstGeom prst="rect">
+            <a:avLst/>
+          </a:prstGeom>
+        </p:spPr>
+      </p:pic>
+      <p:pic>
+        <p:nvPicPr>
+          <p:cNvPr id="76" name="Graphic 38">
+            <a:extLst>
+              <a:ext uri="{FF2B5EF4-FFF2-40B4-BE49-F238E27FC236}">
+                <a16:creationId xmlns:a16="http://schemas.microsoft.com/office/drawing/2014/main" id="{D5C3C3AE-2BBA-E541-BF3B-665D95EACC15}"/>
+              </a:ext>
+            </a:extLst>
+          </p:cNvPr>
+          <p:cNvPicPr>
+            <a:picLocks noChangeAspect="1"/>
+          </p:cNvPicPr>
+          <p:nvPr/>
+        </p:nvPicPr>
+        <p:blipFill>
+          <a:blip r:embed="rId26">
+            <a:extLst>
+              <a:ext uri="{96DAC541-7B7A-43D3-8B79-37D633B846F1}">
+                <asvg:svgBlip xmlns:asvg="http://schemas.microsoft.com/office/drawing/2016/SVG/main" r:embed="rId27"/>
+              </a:ext>
+            </a:extLst>
+          </a:blip>
+          <a:stretch>
+            <a:fillRect/>
+          </a:stretch>
+        </p:blipFill>
+        <p:spPr>
+          <a:xfrm>
+            <a:off x="8129234" y="4224054"/>
+            <a:ext cx="469900" cy="469900"/>
+          </a:xfrm>
+          <a:prstGeom prst="rect">
+            <a:avLst/>
+          </a:prstGeom>
+        </p:spPr>
+      </p:pic>
+      <p:sp>
+        <p:nvSpPr>
+          <p:cNvPr id="77" name="TextBox 58">
+            <a:extLst>
+              <a:ext uri="{FF2B5EF4-FFF2-40B4-BE49-F238E27FC236}">
+                <a16:creationId xmlns:a16="http://schemas.microsoft.com/office/drawing/2014/main" id="{D3F75F86-D6DD-D34A-934E-FC04616E01B4}"/>
+              </a:ext>
+            </a:extLst>
+          </p:cNvPr>
+          <p:cNvSpPr txBox="1"/>
+          <p:nvPr/>
+        </p:nvSpPr>
+        <p:spPr>
+          <a:xfrm>
+            <a:off x="7831094" y="4720759"/>
+            <a:ext cx="999265" cy="646331"/>
+          </a:xfrm>
+          <a:prstGeom prst="rect">
+            <a:avLst/>
+          </a:prstGeom>
+          <a:noFill/>
+        </p:spPr>
+        <p:txBody>
+          <a:bodyPr wrap="square" rtlCol="0">
+            <a:spAutoFit/>
+          </a:bodyPr>
+          <a:lstStyle/>
+          <a:p>
+            <a:pPr algn="ctr"/>
+            <a:r>
+              <a:rPr lang="en-US" sz="1200" dirty="0">
+                <a:latin typeface="Noto Sans CJK JP" panose="020B0500000000000000" pitchFamily="34" charset="-128"/>
+                <a:ea typeface="Noto Sans CJK JP" panose="020B0500000000000000" pitchFamily="34" charset="-128"/>
+              </a:rPr>
+              <a:t>Logs bucket</a:t>
+            </a:r>
+          </a:p>
+          <a:p>
+            <a:pPr algn="ctr"/>
+            <a:r>
+              <a:rPr lang="en-US" sz="1200" dirty="0">
+                <a:latin typeface="Noto Sans CJK JP" panose="020B0500000000000000" pitchFamily="34" charset="-128"/>
+                <a:ea typeface="Noto Sans CJK JP" panose="020B0500000000000000" pitchFamily="34" charset="-128"/>
+              </a:rPr>
+              <a:t>For ALB</a:t>
+            </a:r>
+          </a:p>
+        </p:txBody>
+      </p:sp>
+      <p:sp>
+        <p:nvSpPr>
+          <p:cNvPr id="79" name="TextBox 25">
+            <a:extLst>
+              <a:ext uri="{FF2B5EF4-FFF2-40B4-BE49-F238E27FC236}">
+                <a16:creationId xmlns:a16="http://schemas.microsoft.com/office/drawing/2014/main" id="{3B9C0195-7DD8-8945-9AED-C98E659B613F}"/>
+              </a:ext>
+            </a:extLst>
+          </p:cNvPr>
+          <p:cNvSpPr txBox="1"/>
+          <p:nvPr/>
+        </p:nvSpPr>
+        <p:spPr>
+          <a:xfrm>
+            <a:off x="5374993" y="2769045"/>
+            <a:ext cx="254878" cy="169277"/>
+          </a:xfrm>
+          <a:prstGeom prst="rect">
+            <a:avLst/>
+          </a:prstGeom>
+          <a:noFill/>
+        </p:spPr>
+        <p:txBody>
+          <a:bodyPr wrap="none" lIns="0" tIns="0" rIns="0" bIns="0" rtlCol="0">
+            <a:spAutoFit/>
+          </a:bodyPr>
+          <a:lstStyle/>
+          <a:p>
+            <a:pPr algn="ctr"/>
+            <a:r>
+              <a:rPr lang="en-US" sz="1100" dirty="0">
+                <a:solidFill>
+                  <a:srgbClr val="232F3E"/>
+                </a:solidFill>
+                <a:latin typeface="Noto Sans CJK JP" panose="020B0500000000000000" pitchFamily="34" charset="-128"/>
+                <a:ea typeface="Noto Sans CJK JP" panose="020B0500000000000000" pitchFamily="34" charset="-128"/>
+              </a:rPr>
+              <a:t>ALB</a:t>
+            </a:r>
+          </a:p>
+        </p:txBody>
+      </p:sp>
+      <p:cxnSp>
+        <p:nvCxnSpPr>
+          <p:cNvPr id="80" name="Straight Arrow Connector 30">
+            <a:extLst>
+              <a:ext uri="{FF2B5EF4-FFF2-40B4-BE49-F238E27FC236}">
+                <a16:creationId xmlns:a16="http://schemas.microsoft.com/office/drawing/2014/main" id="{4ED8FFB3-60F3-CE4A-A547-6723ED129E8C}"/>
+              </a:ext>
+            </a:extLst>
+          </p:cNvPr>
+          <p:cNvCxnSpPr>
+            <a:cxnSpLocks/>
+            <a:stCxn id="55" idx="3"/>
+          </p:cNvCxnSpPr>
+          <p:nvPr/>
+        </p:nvCxnSpPr>
+        <p:spPr>
+          <a:xfrm>
+            <a:off x="1055520" y="3420241"/>
+            <a:ext cx="1479462" cy="141078"/>
+          </a:xfrm>
+          <a:prstGeom prst="straightConnector1">
+            <a:avLst/>
+          </a:prstGeom>
+          <a:ln w="12700">
+            <a:solidFill>
+              <a:srgbClr val="545B64"/>
+            </a:solidFill>
+            <a:headEnd type="arrow" w="med" len="sm"/>
+            <a:tailEnd type="none" w="med" len="sm"/>
+          </a:ln>
+        </p:spPr>
+        <p:style>
+          <a:lnRef idx="1">
+            <a:schemeClr val="accent1"/>
+          </a:lnRef>
+          <a:fillRef idx="0">
+            <a:schemeClr val="accent1"/>
+          </a:fillRef>
+          <a:effectRef idx="0">
+            <a:schemeClr val="accent1"/>
+          </a:effectRef>
+          <a:fontRef idx="minor">
+            <a:schemeClr val="tx1"/>
+          </a:fontRef>
+        </p:style>
+      </p:cxnSp>
+      <p:sp>
+        <p:nvSpPr>
+          <p:cNvPr id="58" name="TextBox 58">
+            <a:extLst>
+              <a:ext uri="{FF2B5EF4-FFF2-40B4-BE49-F238E27FC236}">
+                <a16:creationId xmlns:a16="http://schemas.microsoft.com/office/drawing/2014/main" id="{DC567FB4-2DCA-4A41-9460-9430C2DC67F7}"/>
+              </a:ext>
+            </a:extLst>
+          </p:cNvPr>
+          <p:cNvSpPr txBox="1"/>
+          <p:nvPr/>
+        </p:nvSpPr>
+        <p:spPr>
+          <a:xfrm>
+            <a:off x="6360429" y="1163657"/>
+            <a:ext cx="376706" cy="184666"/>
+          </a:xfrm>
+          <a:prstGeom prst="rect">
+            <a:avLst/>
+          </a:prstGeom>
+          <a:noFill/>
+        </p:spPr>
+        <p:txBody>
+          <a:bodyPr wrap="none" lIns="0" tIns="0" rIns="0" bIns="0" rtlCol="0">
+            <a:spAutoFit/>
+          </a:bodyPr>
+          <a:lstStyle/>
+          <a:p>
+            <a:pPr algn="ctr"/>
+            <a:r>
+              <a:rPr lang="en-US" sz="1200" dirty="0">
+                <a:latin typeface="Noto Sans CJK JP" panose="020B0500000000000000" pitchFamily="34" charset="-128"/>
+                <a:ea typeface="Noto Sans CJK JP" panose="020B0500000000000000" pitchFamily="34" charset="-128"/>
+              </a:rPr>
+              <a:t>https</a:t>
+            </a:r>
+          </a:p>
+        </p:txBody>
+      </p:sp>
+      <p:sp>
+        <p:nvSpPr>
+          <p:cNvPr id="61" name="TextBox 58">
+            <a:extLst>
+              <a:ext uri="{FF2B5EF4-FFF2-40B4-BE49-F238E27FC236}">
+                <a16:creationId xmlns:a16="http://schemas.microsoft.com/office/drawing/2014/main" id="{D8D2FCE2-E646-9049-B085-3636C01B5F22}"/>
+              </a:ext>
+            </a:extLst>
+          </p:cNvPr>
+          <p:cNvSpPr txBox="1"/>
+          <p:nvPr/>
+        </p:nvSpPr>
+        <p:spPr>
+          <a:xfrm>
+            <a:off x="5155857" y="2402033"/>
+            <a:ext cx="376706" cy="184666"/>
+          </a:xfrm>
+          <a:prstGeom prst="rect">
+            <a:avLst/>
+          </a:prstGeom>
+          <a:noFill/>
+        </p:spPr>
+        <p:txBody>
+          <a:bodyPr wrap="none" lIns="0" tIns="0" rIns="0" bIns="0" rtlCol="0">
+            <a:spAutoFit/>
+          </a:bodyPr>
+          <a:lstStyle/>
+          <a:p>
+            <a:pPr algn="ctr"/>
+            <a:r>
+              <a:rPr lang="en-US" sz="1200" dirty="0">
+                <a:latin typeface="Noto Sans CJK JP" panose="020B0500000000000000" pitchFamily="34" charset="-128"/>
+                <a:ea typeface="Noto Sans CJK JP" panose="020B0500000000000000" pitchFamily="34" charset="-128"/>
+              </a:rPr>
+              <a:t>https</a:t>
+            </a:r>
+          </a:p>
+        </p:txBody>
+      </p:sp>
+      <p:sp>
+        <p:nvSpPr>
+          <p:cNvPr id="62" name="TextBox 58">
+            <a:extLst>
+              <a:ext uri="{FF2B5EF4-FFF2-40B4-BE49-F238E27FC236}">
+                <a16:creationId xmlns:a16="http://schemas.microsoft.com/office/drawing/2014/main" id="{D9AC545E-03F6-194B-A0BD-549DDA85C006}"/>
+              </a:ext>
+            </a:extLst>
+          </p:cNvPr>
+          <p:cNvSpPr txBox="1"/>
+          <p:nvPr/>
+        </p:nvSpPr>
+        <p:spPr>
+          <a:xfrm>
+            <a:off x="3895559" y="3096514"/>
+            <a:ext cx="304571" cy="184666"/>
+          </a:xfrm>
+          <a:prstGeom prst="rect">
+            <a:avLst/>
+          </a:prstGeom>
+          <a:noFill/>
+        </p:spPr>
+        <p:txBody>
+          <a:bodyPr wrap="none" lIns="0" tIns="0" rIns="0" bIns="0" rtlCol="0">
+            <a:spAutoFit/>
+          </a:bodyPr>
+          <a:lstStyle/>
+          <a:p>
+            <a:pPr algn="ctr"/>
+            <a:r>
+              <a:rPr lang="en-US" sz="1200" dirty="0">
+                <a:latin typeface="Noto Sans CJK JP" panose="020B0500000000000000" pitchFamily="34" charset="-128"/>
+                <a:ea typeface="Noto Sans CJK JP" panose="020B0500000000000000" pitchFamily="34" charset="-128"/>
+              </a:rPr>
+              <a:t>http</a:t>
+            </a:r>
+          </a:p>
+        </p:txBody>
+      </p:sp>
     </p:spTree>
     <p:extLst>
       <p:ext uri="{BB962C8B-B14F-4D97-AF65-F5344CB8AC3E}">

</xml_diff>